<commit_message>
Fix datetime type errors in mental health phenotyping and update documentation
- Fixed timedelta subtraction errors in crisis window calculations
- Added proper datetime conversion for crisis_date and random_date
- Updated final report documentation
- Enhanced data exploration notebook
- Resolved 'unsupported operand type' errors in phenotyping pipeline
</commit_message>
<xml_diff>
--- a/docs/Presentation.pptx
+++ b/docs/Presentation.pptx
@@ -5,26 +5,27 @@
     <p:sldMasterId id="2147483648" r:id="rId1"/>
   </p:sldMasterIdLst>
   <p:notesMasterIdLst>
-    <p:notesMasterId r:id="rId19"/>
+    <p:notesMasterId r:id="rId20"/>
   </p:notesMasterIdLst>
   <p:sldIdLst>
     <p:sldId id="256" r:id="rId2"/>
     <p:sldId id="257" r:id="rId3"/>
-    <p:sldId id="258" r:id="rId4"/>
-    <p:sldId id="269" r:id="rId5"/>
-    <p:sldId id="259" r:id="rId6"/>
-    <p:sldId id="271" r:id="rId7"/>
-    <p:sldId id="260" r:id="rId8"/>
-    <p:sldId id="261" r:id="rId9"/>
-    <p:sldId id="268" r:id="rId10"/>
-    <p:sldId id="262" r:id="rId11"/>
-    <p:sldId id="272" r:id="rId12"/>
-    <p:sldId id="273" r:id="rId13"/>
-    <p:sldId id="263" r:id="rId14"/>
-    <p:sldId id="264" r:id="rId15"/>
-    <p:sldId id="265" r:id="rId16"/>
-    <p:sldId id="266" r:id="rId17"/>
-    <p:sldId id="267" r:id="rId18"/>
+    <p:sldId id="274" r:id="rId4"/>
+    <p:sldId id="258" r:id="rId5"/>
+    <p:sldId id="269" r:id="rId6"/>
+    <p:sldId id="259" r:id="rId7"/>
+    <p:sldId id="271" r:id="rId8"/>
+    <p:sldId id="260" r:id="rId9"/>
+    <p:sldId id="261" r:id="rId10"/>
+    <p:sldId id="268" r:id="rId11"/>
+    <p:sldId id="262" r:id="rId12"/>
+    <p:sldId id="272" r:id="rId13"/>
+    <p:sldId id="273" r:id="rId14"/>
+    <p:sldId id="263" r:id="rId15"/>
+    <p:sldId id="264" r:id="rId16"/>
+    <p:sldId id="265" r:id="rId17"/>
+    <p:sldId id="266" r:id="rId18"/>
+    <p:sldId id="267" r:id="rId19"/>
   </p:sldIdLst>
   <p:sldSz cx="9144000" cy="6858000" type="screen4x3"/>
   <p:notesSz cx="6858000" cy="9144000"/>
@@ -6663,7 +6664,7 @@
           <a:p>
             <a:fld id="{07CD5D32-1B16-AF44-8C5F-EB4416759C8A}" type="slidenum">
               <a:rPr lang="en-US" smtClean="0"/>
-              <a:t>3</a:t>
+              <a:t>4</a:t>
             </a:fld>
             <a:endParaRPr lang="en-US"/>
           </a:p>
@@ -6771,7 +6772,7 @@
           <a:p>
             <a:fld id="{07CD5D32-1B16-AF44-8C5F-EB4416759C8A}" type="slidenum">
               <a:rPr lang="en-US" smtClean="0"/>
-              <a:t>4</a:t>
+              <a:t>5</a:t>
             </a:fld>
             <a:endParaRPr lang="en-US"/>
           </a:p>
@@ -10405,6 +10406,117 @@
 </file>
 
 <file path=ppt/slides/slide10.xml><?xml version="1.0" encoding="utf-8"?>
+<p:sld xmlns:a="http://schemas.openxmlformats.org/drawingml/2006/main" xmlns:r="http://schemas.openxmlformats.org/officeDocument/2006/relationships" xmlns:p="http://schemas.openxmlformats.org/presentationml/2006/main">
+  <p:cSld>
+    <p:spTree>
+      <p:nvGrpSpPr>
+        <p:cNvPr id="1" name="">
+          <a:extLst>
+            <a:ext uri="{FF2B5EF4-FFF2-40B4-BE49-F238E27FC236}">
+              <a16:creationId xmlns:a16="http://schemas.microsoft.com/office/drawing/2014/main" id="{C3070E08-F19E-1BD6-B6EF-5AA1EE747EC9}"/>
+            </a:ext>
+          </a:extLst>
+        </p:cNvPr>
+        <p:cNvGrpSpPr/>
+        <p:nvPr/>
+      </p:nvGrpSpPr>
+      <p:grpSpPr>
+        <a:xfrm>
+          <a:off x="0" y="0"/>
+          <a:ext cx="0" cy="0"/>
+          <a:chOff x="0" y="0"/>
+          <a:chExt cx="0" cy="0"/>
+        </a:xfrm>
+      </p:grpSpPr>
+      <p:sp>
+        <p:nvSpPr>
+          <p:cNvPr id="2" name="Title 1">
+            <a:extLst>
+              <a:ext uri="{FF2B5EF4-FFF2-40B4-BE49-F238E27FC236}">
+                <a16:creationId xmlns:a16="http://schemas.microsoft.com/office/drawing/2014/main" id="{2E97D622-6B0D-6DEB-B861-9030347C1D51}"/>
+              </a:ext>
+            </a:extLst>
+          </p:cNvPr>
+          <p:cNvSpPr>
+            <a:spLocks noGrp="1"/>
+          </p:cNvSpPr>
+          <p:nvPr>
+            <p:ph type="title"/>
+          </p:nvPr>
+        </p:nvSpPr>
+        <p:spPr>
+          <a:xfrm>
+            <a:off x="0" y="0"/>
+            <a:ext cx="9144000" cy="734291"/>
+          </a:xfrm>
+          <a:solidFill>
+            <a:schemeClr val="tx2"/>
+          </a:solidFill>
+        </p:spPr>
+        <p:txBody>
+          <a:bodyPr>
+            <a:normAutofit/>
+          </a:bodyPr>
+          <a:lstStyle/>
+          <a:p>
+            <a:pPr>
+              <a:defRPr sz="3600" b="1"/>
+            </a:pPr>
+            <a:r>
+              <a:rPr lang="en-PH" dirty="0">
+                <a:solidFill>
+                  <a:schemeClr val="bg1"/>
+                </a:solidFill>
+              </a:rPr>
+              <a:t>Results – Prediction Accuracy by Time Window</a:t>
+            </a:r>
+          </a:p>
+        </p:txBody>
+      </p:sp>
+      <p:pic>
+        <p:nvPicPr>
+          <p:cNvPr id="5" name="Picture 4" descr="A graph of a graph showing the results of a performance&#10;&#10;AI-generated content may be incorrect.">
+            <a:extLst>
+              <a:ext uri="{FF2B5EF4-FFF2-40B4-BE49-F238E27FC236}">
+                <a16:creationId xmlns:a16="http://schemas.microsoft.com/office/drawing/2014/main" id="{9BCFD930-6359-D218-E7E4-EBAB8FBFAE78}"/>
+              </a:ext>
+            </a:extLst>
+          </p:cNvPr>
+          <p:cNvPicPr>
+            <a:picLocks noChangeAspect="1"/>
+          </p:cNvPicPr>
+          <p:nvPr/>
+        </p:nvPicPr>
+        <p:blipFill>
+          <a:blip r:embed="rId2"/>
+          <a:stretch>
+            <a:fillRect/>
+          </a:stretch>
+        </p:blipFill>
+        <p:spPr>
+          <a:xfrm>
+            <a:off x="0" y="1096818"/>
+            <a:ext cx="8848524" cy="5269345"/>
+          </a:xfrm>
+          <a:prstGeom prst="rect">
+            <a:avLst/>
+          </a:prstGeom>
+        </p:spPr>
+      </p:pic>
+    </p:spTree>
+    <p:extLst>
+      <p:ext uri="{BB962C8B-B14F-4D97-AF65-F5344CB8AC3E}">
+        <p14:creationId xmlns:p14="http://schemas.microsoft.com/office/powerpoint/2010/main" val="627344468"/>
+      </p:ext>
+    </p:extLst>
+  </p:cSld>
+  <p:clrMapOvr>
+    <a:masterClrMapping/>
+  </p:clrMapOvr>
+</p:sld>
+</file>
+
+<file path=ppt/slides/slide11.xml><?xml version="1.0" encoding="utf-8"?>
 <p:sld xmlns:a="http://schemas.openxmlformats.org/drawingml/2006/main" xmlns:r="http://schemas.openxmlformats.org/officeDocument/2006/relationships" xmlns:p="http://schemas.openxmlformats.org/presentationml/2006/main">
   <p:cSld>
     <p:spTree>
@@ -10996,7 +11108,7 @@
 </p:sld>
 </file>
 
-<file path=ppt/slides/slide11.xml><?xml version="1.0" encoding="utf-8"?>
+<file path=ppt/slides/slide12.xml><?xml version="1.0" encoding="utf-8"?>
 <p:sld xmlns:a="http://schemas.openxmlformats.org/drawingml/2006/main" xmlns:r="http://schemas.openxmlformats.org/officeDocument/2006/relationships" xmlns:p="http://schemas.openxmlformats.org/presentationml/2006/main">
   <p:cSld>
     <p:spTree>
@@ -11142,7 +11254,7 @@
 </p:sld>
 </file>
 
-<file path=ppt/slides/slide12.xml><?xml version="1.0" encoding="utf-8"?>
+<file path=ppt/slides/slide13.xml><?xml version="1.0" encoding="utf-8"?>
 <p:sld xmlns:a="http://schemas.openxmlformats.org/drawingml/2006/main" xmlns:r="http://schemas.openxmlformats.org/officeDocument/2006/relationships" xmlns:p="http://schemas.openxmlformats.org/presentationml/2006/main">
   <p:cSld>
     <p:spTree>
@@ -11288,7 +11400,7 @@
 </p:sld>
 </file>
 
-<file path=ppt/slides/slide13.xml><?xml version="1.0" encoding="utf-8"?>
+<file path=ppt/slides/slide14.xml><?xml version="1.0" encoding="utf-8"?>
 <p:sld xmlns:a="http://schemas.openxmlformats.org/drawingml/2006/main" xmlns:r="http://schemas.openxmlformats.org/officeDocument/2006/relationships" xmlns:p="http://schemas.openxmlformats.org/presentationml/2006/main">
   <p:cSld>
     <p:bg>
@@ -12239,7 +12351,7 @@
 </p:sld>
 </file>
 
-<file path=ppt/slides/slide14.xml><?xml version="1.0" encoding="utf-8"?>
+<file path=ppt/slides/slide15.xml><?xml version="1.0" encoding="utf-8"?>
 <p:sld xmlns:a="http://schemas.openxmlformats.org/drawingml/2006/main" xmlns:r="http://schemas.openxmlformats.org/officeDocument/2006/relationships" xmlns:p="http://schemas.openxmlformats.org/presentationml/2006/main">
   <p:cSld>
     <p:bg>
@@ -13322,7 +13434,7 @@
 </p:sld>
 </file>
 
-<file path=ppt/slides/slide15.xml><?xml version="1.0" encoding="utf-8"?>
+<file path=ppt/slides/slide16.xml><?xml version="1.0" encoding="utf-8"?>
 <p:sld xmlns:a="http://schemas.openxmlformats.org/drawingml/2006/main" xmlns:r="http://schemas.openxmlformats.org/officeDocument/2006/relationships" xmlns:p="http://schemas.openxmlformats.org/presentationml/2006/main">
   <p:cSld>
     <p:bg>
@@ -14149,7 +14261,7 @@
 </p:sld>
 </file>
 
-<file path=ppt/slides/slide16.xml><?xml version="1.0" encoding="utf-8"?>
+<file path=ppt/slides/slide17.xml><?xml version="1.0" encoding="utf-8"?>
 <p:sld xmlns:a="http://schemas.openxmlformats.org/drawingml/2006/main" xmlns:r="http://schemas.openxmlformats.org/officeDocument/2006/relationships" xmlns:p="http://schemas.openxmlformats.org/presentationml/2006/main">
   <p:cSld>
     <p:spTree>
@@ -14199,7 +14311,7 @@
 </p:sld>
 </file>
 
-<file path=ppt/slides/slide17.xml><?xml version="1.0" encoding="utf-8"?>
+<file path=ppt/slides/slide18.xml><?xml version="1.0" encoding="utf-8"?>
 <p:sld xmlns:a="http://schemas.openxmlformats.org/drawingml/2006/main" xmlns:r="http://schemas.openxmlformats.org/officeDocument/2006/relationships" xmlns:p="http://schemas.openxmlformats.org/presentationml/2006/main">
   <p:cSld>
     <p:spTree>
@@ -14257,6 +14369,14 @@
 <file path=ppt/slides/slide2.xml><?xml version="1.0" encoding="utf-8"?>
 <p:sld xmlns:a="http://schemas.openxmlformats.org/drawingml/2006/main" xmlns:r="http://schemas.openxmlformats.org/officeDocument/2006/relationships" xmlns:p="http://schemas.openxmlformats.org/presentationml/2006/main">
   <p:cSld>
+    <p:bg>
+      <p:bgPr>
+        <a:solidFill>
+          <a:schemeClr val="bg1"/>
+        </a:solidFill>
+        <a:effectLst/>
+      </p:bgPr>
+    </p:bg>
     <p:spTree>
       <p:nvGrpSpPr>
         <p:cNvPr id="1" name=""/>
@@ -14271,9 +14391,806 @@
           <a:chExt cx="0" cy="0"/>
         </a:xfrm>
       </p:grpSpPr>
+      <p:sp useBgFill="1">
+        <p:nvSpPr>
+          <p:cNvPr id="9" name="Rectangle 8">
+            <a:extLst>
+              <a:ext uri="{FF2B5EF4-FFF2-40B4-BE49-F238E27FC236}">
+                <a16:creationId xmlns:a16="http://schemas.microsoft.com/office/drawing/2014/main" id="{09588DA8-065E-4F6F-8EFD-43104AB2E0CF}"/>
+              </a:ext>
+              <a:ext uri="{C183D7F6-B498-43B3-948B-1728B52AA6E4}">
+                <adec:decorative xmlns:adec="http://schemas.microsoft.com/office/drawing/2017/decorative" val="1"/>
+              </a:ext>
+            </a:extLst>
+          </p:cNvPr>
+          <p:cNvSpPr>
+            <a:spLocks noGrp="1" noRot="1" noChangeAspect="1" noMove="1" noResize="1" noEditPoints="1" noAdjustHandles="1" noChangeArrowheads="1" noChangeShapeType="1" noTextEdit="1"/>
+          </p:cNvSpPr>
+          <p:nvPr>
+            <p:extLst>
+              <p:ext uri="{386F3935-93C4-4BCD-93E2-E3B085C9AB24}">
+                <p16:designElem xmlns:p16="http://schemas.microsoft.com/office/powerpoint/2015/main" val="1"/>
+              </p:ext>
+            </p:extLst>
+          </p:nvPr>
+        </p:nvSpPr>
+        <p:spPr>
+          <a:xfrm>
+            <a:off x="0" y="0"/>
+            <a:ext cx="9144000" cy="6858000"/>
+          </a:xfrm>
+          <a:prstGeom prst="rect">
+            <a:avLst/>
+          </a:prstGeom>
+          <a:ln w="12700" cap="flat" cmpd="sng" algn="ctr">
+            <a:noFill/>
+            <a:prstDash val="solid"/>
+            <a:miter lim="800000"/>
+          </a:ln>
+          <a:effectLst/>
+          <a:extLst>
+            <a:ext uri="{91240B29-F687-4F45-9708-019B960494DF}">
+              <a14:hiddenLine xmlns:a14="http://schemas.microsoft.com/office/drawing/2010/main" w="12700" cap="flat" cmpd="sng" algn="ctr">
+                <a:solidFill>
+                  <a:schemeClr val="accent1">
+                    <a:shade val="50000"/>
+                  </a:schemeClr>
+                </a:solidFill>
+                <a:prstDash val="solid"/>
+                <a:miter lim="800000"/>
+              </a14:hiddenLine>
+            </a:ext>
+          </a:extLst>
+        </p:spPr>
+        <p:style>
+          <a:lnRef idx="2">
+            <a:schemeClr val="accent1">
+              <a:shade val="50000"/>
+            </a:schemeClr>
+          </a:lnRef>
+          <a:fillRef idx="1">
+            <a:schemeClr val="accent1"/>
+          </a:fillRef>
+          <a:effectRef idx="0">
+            <a:schemeClr val="accent1"/>
+          </a:effectRef>
+          <a:fontRef idx="minor">
+            <a:schemeClr val="lt1"/>
+          </a:fontRef>
+        </p:style>
+        <p:txBody>
+          <a:bodyPr rtlCol="0" anchor="ctr"/>
+          <a:lstStyle/>
+          <a:p>
+            <a:pPr algn="ctr"/>
+            <a:endParaRPr lang="en-US"/>
+          </a:p>
+        </p:txBody>
+      </p:sp>
+      <p:sp useBgFill="1">
+        <p:nvSpPr>
+          <p:cNvPr id="11" name="Rectangle 10">
+            <a:extLst>
+              <a:ext uri="{FF2B5EF4-FFF2-40B4-BE49-F238E27FC236}">
+                <a16:creationId xmlns:a16="http://schemas.microsoft.com/office/drawing/2014/main" id="{C4285719-470E-454C-AF62-8323075F1F5B}"/>
+              </a:ext>
+              <a:ext uri="{C183D7F6-B498-43B3-948B-1728B52AA6E4}">
+                <adec:decorative xmlns:adec="http://schemas.microsoft.com/office/drawing/2017/decorative" val="1"/>
+              </a:ext>
+            </a:extLst>
+          </p:cNvPr>
+          <p:cNvSpPr>
+            <a:spLocks noGrp="1" noRot="1" noChangeAspect="1" noMove="1" noResize="1" noEditPoints="1" noAdjustHandles="1" noChangeArrowheads="1" noChangeShapeType="1" noTextEdit="1"/>
+          </p:cNvSpPr>
+          <p:nvPr>
+            <p:extLst>
+              <p:ext uri="{386F3935-93C4-4BCD-93E2-E3B085C9AB24}">
+                <p16:designElem xmlns:p16="http://schemas.microsoft.com/office/powerpoint/2015/main" val="1"/>
+              </p:ext>
+            </p:extLst>
+          </p:nvPr>
+        </p:nvSpPr>
+        <p:spPr>
+          <a:xfrm>
+            <a:off x="0" y="0"/>
+            <a:ext cx="9141714" cy="6858000"/>
+          </a:xfrm>
+          <a:prstGeom prst="rect">
+            <a:avLst/>
+          </a:prstGeom>
+          <a:ln w="12700" cap="flat" cmpd="sng" algn="ctr">
+            <a:noFill/>
+            <a:prstDash val="solid"/>
+            <a:miter lim="800000"/>
+          </a:ln>
+          <a:effectLst/>
+          <a:extLst>
+            <a:ext uri="{91240B29-F687-4F45-9708-019B960494DF}">
+              <a14:hiddenLine xmlns:a14="http://schemas.microsoft.com/office/drawing/2010/main" w="12700" cap="flat" cmpd="sng" algn="ctr">
+                <a:solidFill>
+                  <a:schemeClr val="accent1">
+                    <a:shade val="50000"/>
+                  </a:schemeClr>
+                </a:solidFill>
+                <a:prstDash val="solid"/>
+                <a:miter lim="800000"/>
+              </a14:hiddenLine>
+            </a:ext>
+          </a:extLst>
+        </p:spPr>
+        <p:style>
+          <a:lnRef idx="2">
+            <a:schemeClr val="accent1">
+              <a:shade val="50000"/>
+            </a:schemeClr>
+          </a:lnRef>
+          <a:fillRef idx="1">
+            <a:schemeClr val="accent1"/>
+          </a:fillRef>
+          <a:effectRef idx="0">
+            <a:schemeClr val="accent1"/>
+          </a:effectRef>
+          <a:fontRef idx="minor">
+            <a:schemeClr val="lt1"/>
+          </a:fontRef>
+        </p:style>
+        <p:txBody>
+          <a:bodyPr rtlCol="0" anchor="ctr"/>
+          <a:lstStyle/>
+          <a:p>
+            <a:pPr algn="ctr"/>
+            <a:endParaRPr lang="en-US"/>
+          </a:p>
+        </p:txBody>
+      </p:sp>
+      <p:sp>
+        <p:nvSpPr>
+          <p:cNvPr id="13" name="Rectangle 12">
+            <a:extLst>
+              <a:ext uri="{FF2B5EF4-FFF2-40B4-BE49-F238E27FC236}">
+                <a16:creationId xmlns:a16="http://schemas.microsoft.com/office/drawing/2014/main" id="{CD9FE4EF-C4D8-49A0-B2FF-81D8DB7D8A24}"/>
+              </a:ext>
+              <a:ext uri="{C183D7F6-B498-43B3-948B-1728B52AA6E4}">
+                <adec:decorative xmlns:adec="http://schemas.microsoft.com/office/drawing/2017/decorative" val="1"/>
+              </a:ext>
+            </a:extLst>
+          </p:cNvPr>
+          <p:cNvSpPr>
+            <a:spLocks noGrp="1" noRot="1" noChangeAspect="1" noMove="1" noResize="1" noEditPoints="1" noAdjustHandles="1" noChangeArrowheads="1" noChangeShapeType="1" noTextEdit="1"/>
+          </p:cNvSpPr>
+          <p:nvPr>
+            <p:extLst>
+              <p:ext uri="{386F3935-93C4-4BCD-93E2-E3B085C9AB24}">
+                <p16:designElem xmlns:p16="http://schemas.microsoft.com/office/powerpoint/2015/main" val="1"/>
+              </p:ext>
+            </p:extLst>
+          </p:nvPr>
+        </p:nvSpPr>
+        <p:spPr>
+          <a:xfrm rot="5400000" flipH="1">
+            <a:off x="-1914813" y="1914812"/>
+            <a:ext cx="6858000" cy="3028377"/>
+          </a:xfrm>
+          <a:prstGeom prst="rect">
+            <a:avLst/>
+          </a:prstGeom>
+          <a:gradFill>
+            <a:gsLst>
+              <a:gs pos="8000">
+                <a:srgbClr val="000000"/>
+              </a:gs>
+              <a:gs pos="100000">
+                <a:schemeClr val="accent1">
+                  <a:lumMod val="75000"/>
+                </a:schemeClr>
+              </a:gs>
+            </a:gsLst>
+            <a:lin ang="3000000" scaled="0"/>
+          </a:gradFill>
+          <a:ln>
+            <a:noFill/>
+          </a:ln>
+        </p:spPr>
+        <p:style>
+          <a:lnRef idx="2">
+            <a:schemeClr val="accent1">
+              <a:shade val="50000"/>
+            </a:schemeClr>
+          </a:lnRef>
+          <a:fillRef idx="1">
+            <a:schemeClr val="accent1"/>
+          </a:fillRef>
+          <a:effectRef idx="0">
+            <a:schemeClr val="accent1"/>
+          </a:effectRef>
+          <a:fontRef idx="minor">
+            <a:schemeClr val="lt1"/>
+          </a:fontRef>
+        </p:style>
+        <p:txBody>
+          <a:bodyPr rtlCol="0" anchor="ctr"/>
+          <a:lstStyle/>
+          <a:p>
+            <a:pPr algn="ctr"/>
+            <a:endParaRPr lang="en-US"/>
+          </a:p>
+        </p:txBody>
+      </p:sp>
+      <p:sp>
+        <p:nvSpPr>
+          <p:cNvPr id="15" name="Rectangle 14">
+            <a:extLst>
+              <a:ext uri="{FF2B5EF4-FFF2-40B4-BE49-F238E27FC236}">
+                <a16:creationId xmlns:a16="http://schemas.microsoft.com/office/drawing/2014/main" id="{4300840D-0A0B-4512-BACA-B439D5B9C57C}"/>
+              </a:ext>
+              <a:ext uri="{C183D7F6-B498-43B3-948B-1728B52AA6E4}">
+                <adec:decorative xmlns:adec="http://schemas.microsoft.com/office/drawing/2017/decorative" val="1"/>
+              </a:ext>
+            </a:extLst>
+          </p:cNvPr>
+          <p:cNvSpPr>
+            <a:spLocks noGrp="1" noRot="1" noChangeAspect="1" noMove="1" noResize="1" noEditPoints="1" noAdjustHandles="1" noChangeArrowheads="1" noChangeShapeType="1" noTextEdit="1"/>
+          </p:cNvSpPr>
+          <p:nvPr>
+            <p:extLst>
+              <p:ext uri="{386F3935-93C4-4BCD-93E2-E3B085C9AB24}">
+                <p16:designElem xmlns:p16="http://schemas.microsoft.com/office/powerpoint/2015/main" val="1"/>
+              </p:ext>
+            </p:extLst>
+          </p:nvPr>
+        </p:nvSpPr>
+        <p:spPr>
+          <a:xfrm rot="5400000" flipH="1">
+            <a:off x="-1914814" y="1924949"/>
+            <a:ext cx="6857999" cy="3028379"/>
+          </a:xfrm>
+          <a:prstGeom prst="rect">
+            <a:avLst/>
+          </a:prstGeom>
+          <a:gradFill>
+            <a:gsLst>
+              <a:gs pos="0">
+                <a:srgbClr val="000000">
+                  <a:alpha val="0"/>
+                </a:srgbClr>
+              </a:gs>
+              <a:gs pos="99000">
+                <a:schemeClr val="accent1">
+                  <a:alpha val="46000"/>
+                </a:schemeClr>
+              </a:gs>
+            </a:gsLst>
+            <a:lin ang="1800000" scaled="0"/>
+          </a:gradFill>
+          <a:ln>
+            <a:noFill/>
+          </a:ln>
+        </p:spPr>
+        <p:style>
+          <a:lnRef idx="2">
+            <a:schemeClr val="accent1">
+              <a:shade val="50000"/>
+            </a:schemeClr>
+          </a:lnRef>
+          <a:fillRef idx="1">
+            <a:schemeClr val="accent1"/>
+          </a:fillRef>
+          <a:effectRef idx="0">
+            <a:schemeClr val="accent1"/>
+          </a:effectRef>
+          <a:fontRef idx="minor">
+            <a:schemeClr val="lt1"/>
+          </a:fontRef>
+        </p:style>
+        <p:txBody>
+          <a:bodyPr rtlCol="0" anchor="ctr"/>
+          <a:lstStyle/>
+          <a:p>
+            <a:pPr algn="ctr"/>
+            <a:endParaRPr lang="en-US"/>
+          </a:p>
+        </p:txBody>
+      </p:sp>
+      <p:sp>
+        <p:nvSpPr>
+          <p:cNvPr id="17" name="Rectangle 16">
+            <a:extLst>
+              <a:ext uri="{FF2B5EF4-FFF2-40B4-BE49-F238E27FC236}">
+                <a16:creationId xmlns:a16="http://schemas.microsoft.com/office/drawing/2014/main" id="{D2B78728-A580-49A7-84F9-6EF6F583ADE0}"/>
+              </a:ext>
+              <a:ext uri="{C183D7F6-B498-43B3-948B-1728B52AA6E4}">
+                <adec:decorative xmlns:adec="http://schemas.microsoft.com/office/drawing/2017/decorative" val="1"/>
+              </a:ext>
+            </a:extLst>
+          </p:cNvPr>
+          <p:cNvSpPr>
+            <a:spLocks noGrp="1" noRot="1" noChangeAspect="1" noMove="1" noResize="1" noEditPoints="1" noAdjustHandles="1" noChangeArrowheads="1" noChangeShapeType="1" noTextEdit="1"/>
+          </p:cNvSpPr>
+          <p:nvPr>
+            <p:extLst>
+              <p:ext uri="{386F3935-93C4-4BCD-93E2-E3B085C9AB24}">
+                <p16:designElem xmlns:p16="http://schemas.microsoft.com/office/powerpoint/2015/main" val="1"/>
+              </p:ext>
+            </p:extLst>
+          </p:nvPr>
+        </p:nvSpPr>
+        <p:spPr>
+          <a:xfrm rot="5400000" flipH="1">
+            <a:off x="263195" y="4092815"/>
+            <a:ext cx="2501979" cy="3028381"/>
+          </a:xfrm>
+          <a:prstGeom prst="rect">
+            <a:avLst/>
+          </a:prstGeom>
+          <a:gradFill>
+            <a:gsLst>
+              <a:gs pos="2000">
+                <a:schemeClr val="accent1">
+                  <a:alpha val="29000"/>
+                </a:schemeClr>
+              </a:gs>
+              <a:gs pos="100000">
+                <a:srgbClr val="000000">
+                  <a:alpha val="30000"/>
+                </a:srgbClr>
+              </a:gs>
+            </a:gsLst>
+            <a:lin ang="7800000" scaled="0"/>
+          </a:gradFill>
+          <a:ln>
+            <a:noFill/>
+          </a:ln>
+        </p:spPr>
+        <p:style>
+          <a:lnRef idx="2">
+            <a:schemeClr val="accent1">
+              <a:shade val="50000"/>
+            </a:schemeClr>
+          </a:lnRef>
+          <a:fillRef idx="1">
+            <a:schemeClr val="accent1"/>
+          </a:fillRef>
+          <a:effectRef idx="0">
+            <a:schemeClr val="accent1"/>
+          </a:effectRef>
+          <a:fontRef idx="minor">
+            <a:schemeClr val="lt1"/>
+          </a:fontRef>
+        </p:style>
+        <p:txBody>
+          <a:bodyPr rtlCol="0" anchor="ctr"/>
+          <a:lstStyle/>
+          <a:p>
+            <a:pPr algn="ctr"/>
+            <a:endParaRPr lang="en-US" dirty="0"/>
+          </a:p>
+        </p:txBody>
+      </p:sp>
+      <p:sp>
+        <p:nvSpPr>
+          <p:cNvPr id="19" name="Freeform: Shape 18">
+            <a:extLst>
+              <a:ext uri="{FF2B5EF4-FFF2-40B4-BE49-F238E27FC236}">
+                <a16:creationId xmlns:a16="http://schemas.microsoft.com/office/drawing/2014/main" id="{38FAA1A1-D861-433F-88FA-1E9D6FD31D11}"/>
+              </a:ext>
+              <a:ext uri="{C183D7F6-B498-43B3-948B-1728B52AA6E4}">
+                <adec:decorative xmlns:adec="http://schemas.microsoft.com/office/drawing/2017/decorative" val="1"/>
+              </a:ext>
+            </a:extLst>
+          </p:cNvPr>
+          <p:cNvSpPr>
+            <a:spLocks noGrp="1" noRot="1" noChangeAspect="1" noMove="1" noResize="1" noEditPoints="1" noAdjustHandles="1" noChangeArrowheads="1" noChangeShapeType="1" noTextEdit="1"/>
+          </p:cNvSpPr>
+          <p:nvPr>
+            <p:extLst>
+              <p:ext uri="{386F3935-93C4-4BCD-93E2-E3B085C9AB24}">
+                <p16:designElem xmlns:p16="http://schemas.microsoft.com/office/powerpoint/2015/main" val="1"/>
+              </p:ext>
+            </p:extLst>
+          </p:nvPr>
+        </p:nvSpPr>
+        <p:spPr>
+          <a:xfrm rot="20635413">
+            <a:off x="-376302" y="969718"/>
+            <a:ext cx="2925267" cy="4178958"/>
+          </a:xfrm>
+          <a:custGeom>
+            <a:avLst/>
+            <a:gdLst>
+              <a:gd name="connsiteX0" fmla="*/ 2432225 w 3900357"/>
+              <a:gd name="connsiteY0" fmla="*/ 93939 h 4178958"/>
+              <a:gd name="connsiteX1" fmla="*/ 3900357 w 3900357"/>
+              <a:gd name="connsiteY1" fmla="*/ 2089479 h 4178958"/>
+              <a:gd name="connsiteX2" fmla="*/ 1810878 w 3900357"/>
+              <a:gd name="connsiteY2" fmla="*/ 4178958 h 4178958"/>
+              <a:gd name="connsiteX3" fmla="*/ 78249 w 3900357"/>
+              <a:gd name="connsiteY3" fmla="*/ 3257727 h 4178958"/>
+              <a:gd name="connsiteX4" fmla="*/ 0 w 3900357"/>
+              <a:gd name="connsiteY4" fmla="*/ 3128923 h 4178958"/>
+              <a:gd name="connsiteX5" fmla="*/ 831324 w 3900357"/>
+              <a:gd name="connsiteY5" fmla="*/ 244281 h 4178958"/>
+              <a:gd name="connsiteX6" fmla="*/ 997559 w 3900357"/>
+              <a:gd name="connsiteY6" fmla="*/ 164202 h 4178958"/>
+              <a:gd name="connsiteX7" fmla="*/ 1810878 w 3900357"/>
+              <a:gd name="connsiteY7" fmla="*/ 0 h 4178958"/>
+              <a:gd name="connsiteX8" fmla="*/ 2432225 w 3900357"/>
+              <a:gd name="connsiteY8" fmla="*/ 93939 h 4178958"/>
+            </a:gdLst>
+            <a:ahLst/>
+            <a:cxnLst>
+              <a:cxn ang="0">
+                <a:pos x="connsiteX0" y="connsiteY0"/>
+              </a:cxn>
+              <a:cxn ang="0">
+                <a:pos x="connsiteX1" y="connsiteY1"/>
+              </a:cxn>
+              <a:cxn ang="0">
+                <a:pos x="connsiteX2" y="connsiteY2"/>
+              </a:cxn>
+              <a:cxn ang="0">
+                <a:pos x="connsiteX3" y="connsiteY3"/>
+              </a:cxn>
+              <a:cxn ang="0">
+                <a:pos x="connsiteX4" y="connsiteY4"/>
+              </a:cxn>
+              <a:cxn ang="0">
+                <a:pos x="connsiteX5" y="connsiteY5"/>
+              </a:cxn>
+              <a:cxn ang="0">
+                <a:pos x="connsiteX6" y="connsiteY6"/>
+              </a:cxn>
+              <a:cxn ang="0">
+                <a:pos x="connsiteX7" y="connsiteY7"/>
+              </a:cxn>
+              <a:cxn ang="0">
+                <a:pos x="connsiteX8" y="connsiteY8"/>
+              </a:cxn>
+            </a:cxnLst>
+            <a:rect l="l" t="t" r="r" b="b"/>
+            <a:pathLst>
+              <a:path w="3900357" h="4178958">
+                <a:moveTo>
+                  <a:pt x="2432225" y="93939"/>
+                </a:moveTo>
+                <a:cubicBezTo>
+                  <a:pt x="3282786" y="358491"/>
+                  <a:pt x="3900357" y="1151865"/>
+                  <a:pt x="3900357" y="2089479"/>
+                </a:cubicBezTo>
+                <a:cubicBezTo>
+                  <a:pt x="3900357" y="3243466"/>
+                  <a:pt x="2964865" y="4178958"/>
+                  <a:pt x="1810878" y="4178958"/>
+                </a:cubicBezTo>
+                <a:cubicBezTo>
+                  <a:pt x="1089636" y="4178958"/>
+                  <a:pt x="453744" y="3813531"/>
+                  <a:pt x="78249" y="3257727"/>
+                </a:cubicBezTo>
+                <a:lnTo>
+                  <a:pt x="0" y="3128923"/>
+                </a:lnTo>
+                <a:lnTo>
+                  <a:pt x="831324" y="244281"/>
+                </a:lnTo>
+                <a:lnTo>
+                  <a:pt x="997559" y="164202"/>
+                </a:lnTo>
+                <a:cubicBezTo>
+                  <a:pt x="1247540" y="58468"/>
+                  <a:pt x="1522381" y="0"/>
+                  <a:pt x="1810878" y="0"/>
+                </a:cubicBezTo>
+                <a:cubicBezTo>
+                  <a:pt x="2027251" y="0"/>
+                  <a:pt x="2235942" y="32888"/>
+                  <a:pt x="2432225" y="93939"/>
+                </a:cubicBezTo>
+                <a:close/>
+              </a:path>
+            </a:pathLst>
+          </a:custGeom>
+          <a:gradFill>
+            <a:gsLst>
+              <a:gs pos="29000">
+                <a:srgbClr val="000000">
+                  <a:alpha val="0"/>
+                </a:srgbClr>
+              </a:gs>
+              <a:gs pos="100000">
+                <a:schemeClr val="accent1">
+                  <a:alpha val="43000"/>
+                </a:schemeClr>
+              </a:gs>
+            </a:gsLst>
+            <a:lin ang="1800000" scaled="0"/>
+          </a:gradFill>
+          <a:ln>
+            <a:noFill/>
+          </a:ln>
+        </p:spPr>
+        <p:style>
+          <a:lnRef idx="2">
+            <a:schemeClr val="accent1">
+              <a:shade val="50000"/>
+            </a:schemeClr>
+          </a:lnRef>
+          <a:fillRef idx="1">
+            <a:schemeClr val="accent1"/>
+          </a:fillRef>
+          <a:effectRef idx="0">
+            <a:schemeClr val="accent1"/>
+          </a:effectRef>
+          <a:fontRef idx="minor">
+            <a:schemeClr val="lt1"/>
+          </a:fontRef>
+        </p:style>
+        <p:txBody>
+          <a:bodyPr wrap="square" rtlCol="0" anchor="ctr">
+            <a:noAutofit/>
+          </a:bodyPr>
+          <a:lstStyle/>
+          <a:p>
+            <a:pPr algn="ctr"/>
+            <a:endParaRPr lang="en-US" dirty="0"/>
+          </a:p>
+        </p:txBody>
+      </p:sp>
+      <p:sp>
+        <p:nvSpPr>
+          <p:cNvPr id="21" name="Rectangle 20">
+            <a:extLst>
+              <a:ext uri="{FF2B5EF4-FFF2-40B4-BE49-F238E27FC236}">
+                <a16:creationId xmlns:a16="http://schemas.microsoft.com/office/drawing/2014/main" id="{8D71EDA1-87BF-4D5D-AB79-F346FD19278A}"/>
+              </a:ext>
+              <a:ext uri="{C183D7F6-B498-43B3-948B-1728B52AA6E4}">
+                <adec:decorative xmlns:adec="http://schemas.microsoft.com/office/drawing/2017/decorative" val="1"/>
+              </a:ext>
+            </a:extLst>
+          </p:cNvPr>
+          <p:cNvSpPr>
+            <a:spLocks noGrp="1" noRot="1" noChangeAspect="1" noMove="1" noResize="1" noEditPoints="1" noAdjustHandles="1" noChangeArrowheads="1" noChangeShapeType="1" noTextEdit="1"/>
+          </p:cNvSpPr>
+          <p:nvPr>
+            <p:extLst>
+              <p:ext uri="{386F3935-93C4-4BCD-93E2-E3B085C9AB24}">
+                <p16:designElem xmlns:p16="http://schemas.microsoft.com/office/powerpoint/2015/main" val="1"/>
+              </p:ext>
+            </p:extLst>
+          </p:nvPr>
+        </p:nvSpPr>
+        <p:spPr>
+          <a:xfrm rot="5400000" flipH="1">
+            <a:off x="-1914820" y="1904672"/>
+            <a:ext cx="6858003" cy="3028376"/>
+          </a:xfrm>
+          <a:prstGeom prst="rect">
+            <a:avLst/>
+          </a:prstGeom>
+          <a:gradFill>
+            <a:gsLst>
+              <a:gs pos="0">
+                <a:srgbClr val="000000">
+                  <a:alpha val="0"/>
+                </a:srgbClr>
+              </a:gs>
+              <a:gs pos="99000">
+                <a:schemeClr val="accent1">
+                  <a:lumMod val="60000"/>
+                  <a:lumOff val="40000"/>
+                  <a:alpha val="11000"/>
+                </a:schemeClr>
+              </a:gs>
+            </a:gsLst>
+            <a:lin ang="7200000" scaled="0"/>
+          </a:gradFill>
+          <a:ln>
+            <a:noFill/>
+          </a:ln>
+        </p:spPr>
+        <p:style>
+          <a:lnRef idx="2">
+            <a:schemeClr val="accent1">
+              <a:shade val="50000"/>
+            </a:schemeClr>
+          </a:lnRef>
+          <a:fillRef idx="1">
+            <a:schemeClr val="accent1"/>
+          </a:fillRef>
+          <a:effectRef idx="0">
+            <a:schemeClr val="accent1"/>
+          </a:effectRef>
+          <a:fontRef idx="minor">
+            <a:schemeClr val="lt1"/>
+          </a:fontRef>
+        </p:style>
+        <p:txBody>
+          <a:bodyPr rtlCol="0" anchor="ctr"/>
+          <a:lstStyle/>
+          <a:p>
+            <a:pPr algn="ctr"/>
+            <a:endParaRPr lang="en-US"/>
+          </a:p>
+        </p:txBody>
+      </p:sp>
       <p:sp>
         <p:nvSpPr>
           <p:cNvPr id="2" name="Title 1"/>
+          <p:cNvSpPr>
+            <a:spLocks noGrp="1"/>
+          </p:cNvSpPr>
+          <p:nvPr>
+            <p:ph type="title"/>
+          </p:nvPr>
+        </p:nvSpPr>
+        <p:spPr>
+          <a:xfrm>
+            <a:off x="350041" y="586855"/>
+            <a:ext cx="2401025" cy="3387497"/>
+          </a:xfrm>
+        </p:spPr>
+        <p:txBody>
+          <a:bodyPr anchor="b">
+            <a:normAutofit/>
+          </a:bodyPr>
+          <a:lstStyle/>
+          <a:p>
+            <a:pPr algn="r">
+              <a:defRPr sz="3600" b="1"/>
+            </a:pPr>
+            <a:r>
+              <a:rPr lang="en-PH" sz="3500" dirty="0">
+                <a:solidFill>
+                  <a:srgbClr val="FFFFFF"/>
+                </a:solidFill>
+              </a:rPr>
+              <a:t>Documents and Code References</a:t>
+            </a:r>
+          </a:p>
+        </p:txBody>
+      </p:sp>
+      <p:sp>
+        <p:nvSpPr>
+          <p:cNvPr id="4" name="Content Placeholder 3">
+            <a:extLst>
+              <a:ext uri="{FF2B5EF4-FFF2-40B4-BE49-F238E27FC236}">
+                <a16:creationId xmlns:a16="http://schemas.microsoft.com/office/drawing/2014/main" id="{2E843709-0406-E50A-3C02-5A150DEBC07D}"/>
+              </a:ext>
+            </a:extLst>
+          </p:cNvPr>
+          <p:cNvSpPr>
+            <a:spLocks noGrp="1"/>
+          </p:cNvSpPr>
+          <p:nvPr>
+            <p:ph idx="1"/>
+          </p:nvPr>
+        </p:nvSpPr>
+        <p:spPr>
+          <a:xfrm>
+            <a:off x="3607694" y="649480"/>
+            <a:ext cx="4916510" cy="5546047"/>
+          </a:xfrm>
+        </p:spPr>
+        <p:txBody>
+          <a:bodyPr anchor="ctr">
+            <a:normAutofit/>
+          </a:bodyPr>
+          <a:lstStyle/>
+          <a:p>
+            <a:r>
+              <a:rPr lang="en-US" sz="1700" dirty="0"/>
+              <a:t>Repository:</a:t>
+            </a:r>
+          </a:p>
+          <a:p>
+            <a:pPr lvl="1"/>
+            <a:r>
+              <a:rPr lang="en-US" sz="1700" dirty="0">
+                <a:hlinkClick r:id="rId2"/>
+              </a:rPr>
+              <a:t>https://github.com/sajdutts/multimodal-mental-health-ai</a:t>
+            </a:r>
+            <a:endParaRPr lang="en-US" sz="1700" dirty="0"/>
+          </a:p>
+          <a:p>
+            <a:endParaRPr lang="en-US" sz="1700" dirty="0"/>
+          </a:p>
+          <a:p>
+            <a:r>
+              <a:rPr lang="en-US" sz="1700" dirty="0"/>
+              <a:t>Source files:</a:t>
+            </a:r>
+          </a:p>
+          <a:p>
+            <a:pPr lvl="1"/>
+            <a:r>
+              <a:rPr lang="en-US" sz="1700" dirty="0">
+                <a:hlinkClick r:id="rId3"/>
+              </a:rPr>
+              <a:t>https://github.com/sajdutts/multimodal-mental-health-ai/tree/main/src</a:t>
+            </a:r>
+            <a:endParaRPr lang="en-US" sz="1700" dirty="0"/>
+          </a:p>
+          <a:p>
+            <a:endParaRPr lang="en-US" sz="1700" dirty="0"/>
+          </a:p>
+          <a:p>
+            <a:r>
+              <a:rPr lang="en-US" sz="1700" dirty="0"/>
+              <a:t>Notebook:</a:t>
+            </a:r>
+          </a:p>
+          <a:p>
+            <a:pPr lvl="1"/>
+            <a:r>
+              <a:rPr lang="en-US" sz="1700" dirty="0">
+                <a:hlinkClick r:id="rId4"/>
+              </a:rPr>
+              <a:t>https://github.com/sajdutts/multimodal-mental-health-ai/tree/main/notebooks/exploration</a:t>
+            </a:r>
+            <a:endParaRPr lang="en-US" sz="1700" dirty="0"/>
+          </a:p>
+          <a:p>
+            <a:endParaRPr lang="en-US" sz="1700" dirty="0"/>
+          </a:p>
+          <a:p>
+            <a:r>
+              <a:rPr lang="en-US" sz="1700" dirty="0"/>
+              <a:t>Presentation:</a:t>
+            </a:r>
+          </a:p>
+          <a:p>
+            <a:pPr lvl="1"/>
+            <a:r>
+              <a:rPr lang="en-US" sz="1700" dirty="0">
+                <a:hlinkClick r:id="rId5"/>
+              </a:rPr>
+              <a:t>https://github.com/sajdutts/multimodal-mental-health-ai/tree/main/docs</a:t>
+            </a:r>
+            <a:endParaRPr lang="en-US" sz="1700" dirty="0"/>
+          </a:p>
+        </p:txBody>
+      </p:sp>
+    </p:spTree>
+  </p:cSld>
+  <p:clrMapOvr>
+    <a:masterClrMapping/>
+  </p:clrMapOvr>
+</p:sld>
+</file>
+
+<file path=ppt/slides/slide3.xml><?xml version="1.0" encoding="utf-8"?>
+<p:sld xmlns:a="http://schemas.openxmlformats.org/drawingml/2006/main" xmlns:r="http://schemas.openxmlformats.org/officeDocument/2006/relationships" xmlns:p="http://schemas.openxmlformats.org/presentationml/2006/main">
+  <p:cSld>
+    <p:spTree>
+      <p:nvGrpSpPr>
+        <p:cNvPr id="1" name="">
+          <a:extLst>
+            <a:ext uri="{FF2B5EF4-FFF2-40B4-BE49-F238E27FC236}">
+              <a16:creationId xmlns:a16="http://schemas.microsoft.com/office/drawing/2014/main" id="{004330F8-0341-4E97-984F-9523D1469D8B}"/>
+            </a:ext>
+          </a:extLst>
+        </p:cNvPr>
+        <p:cNvGrpSpPr/>
+        <p:nvPr/>
+      </p:nvGrpSpPr>
+      <p:grpSpPr>
+        <a:xfrm>
+          <a:off x="0" y="0"/>
+          <a:ext cx="0" cy="0"/>
+          <a:chOff x="0" y="0"/>
+          <a:chExt cx="0" cy="0"/>
+        </a:xfrm>
+      </p:grpSpPr>
+      <p:sp>
+        <p:nvSpPr>
+          <p:cNvPr id="2" name="Title 1">
+            <a:extLst>
+              <a:ext uri="{FF2B5EF4-FFF2-40B4-BE49-F238E27FC236}">
+                <a16:creationId xmlns:a16="http://schemas.microsoft.com/office/drawing/2014/main" id="{71274001-892F-D290-5E03-95895A9DA863}"/>
+              </a:ext>
+            </a:extLst>
+          </p:cNvPr>
           <p:cNvSpPr>
             <a:spLocks noGrp="1"/>
           </p:cNvSpPr>
@@ -14301,7 +15218,7 @@
           <p:cNvPr id="5" name="Content Placeholder 2">
             <a:extLst>
               <a:ext uri="{FF2B5EF4-FFF2-40B4-BE49-F238E27FC236}">
-                <a16:creationId xmlns:a16="http://schemas.microsoft.com/office/drawing/2014/main" id="{EE090DE4-E841-00BE-ADB4-F9A3E1816DA3}"/>
+                <a16:creationId xmlns:a16="http://schemas.microsoft.com/office/drawing/2014/main" id="{0CCD3B5B-8C55-D13D-6C82-7C4D8C380107}"/>
               </a:ext>
             </a:extLst>
           </p:cNvPr>
@@ -14323,6 +15240,11 @@
         </a:graphic>
       </p:graphicFrame>
     </p:spTree>
+    <p:extLst>
+      <p:ext uri="{BB962C8B-B14F-4D97-AF65-F5344CB8AC3E}">
+        <p14:creationId xmlns:p14="http://schemas.microsoft.com/office/powerpoint/2010/main" val="1762566305"/>
+      </p:ext>
+    </p:extLst>
   </p:cSld>
   <p:clrMapOvr>
     <a:masterClrMapping/>
@@ -14330,7 +15252,7 @@
 </p:sld>
 </file>
 
-<file path=ppt/slides/slide3.xml><?xml version="1.0" encoding="utf-8"?>
+<file path=ppt/slides/slide4.xml><?xml version="1.0" encoding="utf-8"?>
 <p:sld xmlns:a="http://schemas.openxmlformats.org/drawingml/2006/main" xmlns:r="http://schemas.openxmlformats.org/officeDocument/2006/relationships" xmlns:p="http://schemas.openxmlformats.org/presentationml/2006/main">
   <p:cSld>
     <p:bg>
@@ -15221,7 +16143,7 @@
 </p:sld>
 </file>
 
-<file path=ppt/slides/slide4.xml><?xml version="1.0" encoding="utf-8"?>
+<file path=ppt/slides/slide5.xml><?xml version="1.0" encoding="utf-8"?>
 <p:sld xmlns:a="http://schemas.openxmlformats.org/drawingml/2006/main" xmlns:r="http://schemas.openxmlformats.org/officeDocument/2006/relationships" xmlns:p="http://schemas.openxmlformats.org/presentationml/2006/main">
   <p:cSld>
     <p:bg>
@@ -16249,7 +17171,7 @@
 </p:sld>
 </file>
 
-<file path=ppt/slides/slide5.xml><?xml version="1.0" encoding="utf-8"?>
+<file path=ppt/slides/slide6.xml><?xml version="1.0" encoding="utf-8"?>
 <p:sld xmlns:a="http://schemas.openxmlformats.org/drawingml/2006/main" xmlns:r="http://schemas.openxmlformats.org/officeDocument/2006/relationships" xmlns:p="http://schemas.openxmlformats.org/presentationml/2006/main">
   <p:cSld>
     <p:bg>
@@ -17316,7 +18238,7 @@
 </p:sld>
 </file>
 
-<file path=ppt/slides/slide6.xml><?xml version="1.0" encoding="utf-8"?>
+<file path=ppt/slides/slide7.xml><?xml version="1.0" encoding="utf-8"?>
 <p:sld xmlns:a="http://schemas.openxmlformats.org/drawingml/2006/main" xmlns:r="http://schemas.openxmlformats.org/officeDocument/2006/relationships" xmlns:p="http://schemas.openxmlformats.org/presentationml/2006/main">
   <p:cSld>
     <p:bg>
@@ -18069,7 +18991,7 @@
 </p:sld>
 </file>
 
-<file path=ppt/slides/slide7.xml><?xml version="1.0" encoding="utf-8"?>
+<file path=ppt/slides/slide8.xml><?xml version="1.0" encoding="utf-8"?>
 <p:sld xmlns:a="http://schemas.openxmlformats.org/drawingml/2006/main" xmlns:r="http://schemas.openxmlformats.org/officeDocument/2006/relationships" xmlns:p="http://schemas.openxmlformats.org/presentationml/2006/main">
   <p:cSld>
     <p:bg>
@@ -18962,7 +19884,7 @@
 </p:sld>
 </file>
 
-<file path=ppt/slides/slide8.xml><?xml version="1.0" encoding="utf-8"?>
+<file path=ppt/slides/slide9.xml><?xml version="1.0" encoding="utf-8"?>
 <p:sld xmlns:a="http://schemas.openxmlformats.org/drawingml/2006/main" xmlns:r="http://schemas.openxmlformats.org/officeDocument/2006/relationships" xmlns:p="http://schemas.openxmlformats.org/presentationml/2006/main">
   <p:cSld>
     <p:spTree>
@@ -19318,117 +20240,6 @@
         </a:graphic>
       </p:graphicFrame>
     </p:spTree>
-  </p:cSld>
-  <p:clrMapOvr>
-    <a:masterClrMapping/>
-  </p:clrMapOvr>
-</p:sld>
-</file>
-
-<file path=ppt/slides/slide9.xml><?xml version="1.0" encoding="utf-8"?>
-<p:sld xmlns:a="http://schemas.openxmlformats.org/drawingml/2006/main" xmlns:r="http://schemas.openxmlformats.org/officeDocument/2006/relationships" xmlns:p="http://schemas.openxmlformats.org/presentationml/2006/main">
-  <p:cSld>
-    <p:spTree>
-      <p:nvGrpSpPr>
-        <p:cNvPr id="1" name="">
-          <a:extLst>
-            <a:ext uri="{FF2B5EF4-FFF2-40B4-BE49-F238E27FC236}">
-              <a16:creationId xmlns:a16="http://schemas.microsoft.com/office/drawing/2014/main" id="{C3070E08-F19E-1BD6-B6EF-5AA1EE747EC9}"/>
-            </a:ext>
-          </a:extLst>
-        </p:cNvPr>
-        <p:cNvGrpSpPr/>
-        <p:nvPr/>
-      </p:nvGrpSpPr>
-      <p:grpSpPr>
-        <a:xfrm>
-          <a:off x="0" y="0"/>
-          <a:ext cx="0" cy="0"/>
-          <a:chOff x="0" y="0"/>
-          <a:chExt cx="0" cy="0"/>
-        </a:xfrm>
-      </p:grpSpPr>
-      <p:sp>
-        <p:nvSpPr>
-          <p:cNvPr id="2" name="Title 1">
-            <a:extLst>
-              <a:ext uri="{FF2B5EF4-FFF2-40B4-BE49-F238E27FC236}">
-                <a16:creationId xmlns:a16="http://schemas.microsoft.com/office/drawing/2014/main" id="{2E97D622-6B0D-6DEB-B861-9030347C1D51}"/>
-              </a:ext>
-            </a:extLst>
-          </p:cNvPr>
-          <p:cNvSpPr>
-            <a:spLocks noGrp="1"/>
-          </p:cNvSpPr>
-          <p:nvPr>
-            <p:ph type="title"/>
-          </p:nvPr>
-        </p:nvSpPr>
-        <p:spPr>
-          <a:xfrm>
-            <a:off x="0" y="0"/>
-            <a:ext cx="9144000" cy="734291"/>
-          </a:xfrm>
-          <a:solidFill>
-            <a:schemeClr val="tx2"/>
-          </a:solidFill>
-        </p:spPr>
-        <p:txBody>
-          <a:bodyPr>
-            <a:normAutofit/>
-          </a:bodyPr>
-          <a:lstStyle/>
-          <a:p>
-            <a:pPr>
-              <a:defRPr sz="3600" b="1"/>
-            </a:pPr>
-            <a:r>
-              <a:rPr lang="en-PH" dirty="0">
-                <a:solidFill>
-                  <a:schemeClr val="bg1"/>
-                </a:solidFill>
-              </a:rPr>
-              <a:t>Results – Prediction Accuracy by Time Window</a:t>
-            </a:r>
-          </a:p>
-        </p:txBody>
-      </p:sp>
-      <p:pic>
-        <p:nvPicPr>
-          <p:cNvPr id="5" name="Picture 4" descr="A graph of a graph showing the results of a performance&#10;&#10;AI-generated content may be incorrect.">
-            <a:extLst>
-              <a:ext uri="{FF2B5EF4-FFF2-40B4-BE49-F238E27FC236}">
-                <a16:creationId xmlns:a16="http://schemas.microsoft.com/office/drawing/2014/main" id="{9BCFD930-6359-D218-E7E4-EBAB8FBFAE78}"/>
-              </a:ext>
-            </a:extLst>
-          </p:cNvPr>
-          <p:cNvPicPr>
-            <a:picLocks noChangeAspect="1"/>
-          </p:cNvPicPr>
-          <p:nvPr/>
-        </p:nvPicPr>
-        <p:blipFill>
-          <a:blip r:embed="rId2"/>
-          <a:stretch>
-            <a:fillRect/>
-          </a:stretch>
-        </p:blipFill>
-        <p:spPr>
-          <a:xfrm>
-            <a:off x="0" y="1096818"/>
-            <a:ext cx="8848524" cy="5269345"/>
-          </a:xfrm>
-          <a:prstGeom prst="rect">
-            <a:avLst/>
-          </a:prstGeom>
-        </p:spPr>
-      </p:pic>
-    </p:spTree>
-    <p:extLst>
-      <p:ext uri="{BB962C8B-B14F-4D97-AF65-F5344CB8AC3E}">
-        <p14:creationId xmlns:p14="http://schemas.microsoft.com/office/powerpoint/2010/main" val="627344468"/>
-      </p:ext>
-    </p:extLst>
   </p:cSld>
   <p:clrMapOvr>
     <a:masterClrMapping/>

</xml_diff>